<commit_message>
Edited PPT master slides.
</commit_message>
<xml_diff>
--- a/lecture_content/classSlides/2_collectivesPattern/collectivesPattern.pptx
+++ b/lecture_content/classSlides/2_collectivesPattern/collectivesPattern.pptx
@@ -257,7 +257,7 @@
               <a:pPr>
                 <a:defRPr/>
               </a:pPr>
-              <a:t>3/6/14</a:t>
+              <a:t>3/10/14</a:t>
             </a:fld>
             <a:endParaRPr lang="en-US"/>
           </a:p>
@@ -481,7 +481,7 @@
               <a:pPr>
                 <a:defRPr/>
               </a:pPr>
-              <a:t>3/6/14</a:t>
+              <a:t>3/10/14</a:t>
             </a:fld>
             <a:endParaRPr lang="en-US"/>
           </a:p>
@@ -1949,33 +1949,42 @@
             <p:ph type="title"/>
           </p:nvPr>
         </p:nvSpPr>
-        <p:spPr/>
-        <p:txBody>
-          <a:bodyPr/>
-          <a:lstStyle/>
-          <a:p>
-            <a:r>
-              <a:rPr lang="en-US" smtClean="0"/>
-              <a:t>Click to edit Master title style</a:t>
-            </a:r>
-            <a:endParaRPr lang="en-US"/>
-          </a:p>
-        </p:txBody>
-      </p:sp>
-      <p:sp>
-        <p:nvSpPr>
-          <p:cNvPr id="3" name="Content Placeholder 2"/>
-          <p:cNvSpPr>
-            <a:spLocks noGrp="1"/>
-          </p:cNvSpPr>
-          <p:nvPr>
-            <p:ph sz="half" idx="1"/>
-          </p:nvPr>
-        </p:nvSpPr>
         <p:spPr>
           <a:xfrm>
-            <a:off x="457200" y="1600200"/>
-            <a:ext cx="4038600" cy="4525963"/>
+            <a:off x="238125" y="0"/>
+            <a:ext cx="8905875" cy="874346"/>
+          </a:xfrm>
+        </p:spPr>
+        <p:txBody>
+          <a:bodyPr/>
+          <a:lstStyle>
+            <a:lvl1pPr>
+              <a:defRPr b="1" i="1"/>
+            </a:lvl1pPr>
+          </a:lstStyle>
+          <a:p>
+            <a:r>
+              <a:rPr lang="en-US" dirty="0" smtClean="0"/>
+              <a:t>Click to edit Master title style</a:t>
+            </a:r>
+            <a:endParaRPr lang="en-US" dirty="0"/>
+          </a:p>
+        </p:txBody>
+      </p:sp>
+      <p:sp>
+        <p:nvSpPr>
+          <p:cNvPr id="3" name="Content Placeholder 2"/>
+          <p:cNvSpPr>
+            <a:spLocks noGrp="1"/>
+          </p:cNvSpPr>
+          <p:nvPr>
+            <p:ph sz="half" idx="1"/>
+          </p:nvPr>
+        </p:nvSpPr>
+        <p:spPr>
+          <a:xfrm>
+            <a:off x="228600" y="884237"/>
+            <a:ext cx="4453128" cy="5516563"/>
           </a:xfrm>
         </p:spPr>
         <p:txBody>
@@ -2012,38 +2021,38 @@
           <a:p>
             <a:pPr lvl="0"/>
             <a:r>
-              <a:rPr lang="en-US" smtClean="0"/>
+              <a:rPr lang="en-US" dirty="0" smtClean="0"/>
               <a:t>Click to edit Master text styles</a:t>
             </a:r>
           </a:p>
           <a:p>
             <a:pPr lvl="1"/>
             <a:r>
-              <a:rPr lang="en-US" smtClean="0"/>
+              <a:rPr lang="en-US" dirty="0" smtClean="0"/>
               <a:t>Second level</a:t>
             </a:r>
           </a:p>
           <a:p>
             <a:pPr lvl="2"/>
             <a:r>
-              <a:rPr lang="en-US" smtClean="0"/>
+              <a:rPr lang="en-US" dirty="0" smtClean="0"/>
               <a:t>Third level</a:t>
             </a:r>
           </a:p>
           <a:p>
             <a:pPr lvl="3"/>
             <a:r>
-              <a:rPr lang="en-US" smtClean="0"/>
+              <a:rPr lang="en-US" dirty="0" smtClean="0"/>
               <a:t>Fourth level</a:t>
             </a:r>
           </a:p>
           <a:p>
             <a:pPr lvl="4"/>
             <a:r>
-              <a:rPr lang="en-US" smtClean="0"/>
+              <a:rPr lang="en-US" dirty="0" smtClean="0"/>
               <a:t>Fifth level</a:t>
             </a:r>
-            <a:endParaRPr lang="en-US"/>
+            <a:endParaRPr lang="en-US" dirty="0"/>
           </a:p>
         </p:txBody>
       </p:sp>
@@ -2059,8 +2068,8 @@
         </p:nvSpPr>
         <p:spPr>
           <a:xfrm>
-            <a:off x="4648200" y="1600200"/>
-            <a:ext cx="4038600" cy="4525963"/>
+            <a:off x="4690872" y="884237"/>
+            <a:ext cx="4453128" cy="5516563"/>
           </a:xfrm>
         </p:spPr>
         <p:txBody>
@@ -2097,38 +2106,38 @@
           <a:p>
             <a:pPr lvl="0"/>
             <a:r>
-              <a:rPr lang="en-US" smtClean="0"/>
+              <a:rPr lang="en-US" dirty="0" smtClean="0"/>
               <a:t>Click to edit Master text styles</a:t>
             </a:r>
           </a:p>
           <a:p>
             <a:pPr lvl="1"/>
             <a:r>
-              <a:rPr lang="en-US" smtClean="0"/>
+              <a:rPr lang="en-US" dirty="0" smtClean="0"/>
               <a:t>Second level</a:t>
             </a:r>
           </a:p>
           <a:p>
             <a:pPr lvl="2"/>
             <a:r>
-              <a:rPr lang="en-US" smtClean="0"/>
+              <a:rPr lang="en-US" dirty="0" smtClean="0"/>
               <a:t>Third level</a:t>
             </a:r>
           </a:p>
           <a:p>
             <a:pPr lvl="3"/>
             <a:r>
-              <a:rPr lang="en-US" smtClean="0"/>
+              <a:rPr lang="en-US" dirty="0" smtClean="0"/>
               <a:t>Fourth level</a:t>
             </a:r>
           </a:p>
           <a:p>
             <a:pPr lvl="4"/>
             <a:r>
-              <a:rPr lang="en-US" smtClean="0"/>
+              <a:rPr lang="en-US" dirty="0" smtClean="0"/>
               <a:t>Fifth level</a:t>
             </a:r>
-            <a:endParaRPr lang="en-US"/>
+            <a:endParaRPr lang="en-US" dirty="0"/>
           </a:p>
         </p:txBody>
       </p:sp>
@@ -2235,20 +2244,25 @@
             <p:ph type="title"/>
           </p:nvPr>
         </p:nvSpPr>
-        <p:spPr/>
+        <p:spPr>
+          <a:xfrm>
+            <a:off x="238125" y="0"/>
+            <a:ext cx="8905875" cy="874346"/>
+          </a:xfrm>
+        </p:spPr>
         <p:txBody>
           <a:bodyPr/>
           <a:lstStyle>
             <a:lvl1pPr>
-              <a:defRPr/>
+              <a:defRPr b="1" i="1"/>
             </a:lvl1pPr>
           </a:lstStyle>
           <a:p>
             <a:r>
-              <a:rPr lang="en-US" smtClean="0"/>
+              <a:rPr lang="en-US" dirty="0" smtClean="0"/>
               <a:t>Click to edit Master title style</a:t>
             </a:r>
-            <a:endParaRPr lang="en-US"/>
+            <a:endParaRPr lang="en-US" dirty="0"/>
           </a:p>
         </p:txBody>
       </p:sp>
@@ -2264,8 +2278,8 @@
         </p:nvSpPr>
         <p:spPr>
           <a:xfrm>
-            <a:off x="457200" y="1535113"/>
-            <a:ext cx="4040188" cy="639762"/>
+            <a:off x="228600" y="895350"/>
+            <a:ext cx="4453128" cy="639762"/>
           </a:xfrm>
         </p:spPr>
         <p:txBody>
@@ -2311,7 +2325,7 @@
           <a:p>
             <a:pPr lvl="0"/>
             <a:r>
-              <a:rPr lang="en-US" smtClean="0"/>
+              <a:rPr lang="en-US" dirty="0" smtClean="0"/>
               <a:t>Click to edit Master text styles</a:t>
             </a:r>
           </a:p>
@@ -2329,8 +2343,8 @@
         </p:nvSpPr>
         <p:spPr>
           <a:xfrm>
-            <a:off x="457200" y="2174875"/>
-            <a:ext cx="4040188" cy="3951288"/>
+            <a:off x="228600" y="1535112"/>
+            <a:ext cx="4453128" cy="3951288"/>
           </a:xfrm>
         </p:spPr>
         <p:txBody>
@@ -2367,38 +2381,38 @@
           <a:p>
             <a:pPr lvl="0"/>
             <a:r>
-              <a:rPr lang="en-US" smtClean="0"/>
+              <a:rPr lang="en-US" dirty="0" smtClean="0"/>
               <a:t>Click to edit Master text styles</a:t>
             </a:r>
           </a:p>
           <a:p>
             <a:pPr lvl="1"/>
             <a:r>
-              <a:rPr lang="en-US" smtClean="0"/>
+              <a:rPr lang="en-US" dirty="0" smtClean="0"/>
               <a:t>Second level</a:t>
             </a:r>
           </a:p>
           <a:p>
             <a:pPr lvl="2"/>
             <a:r>
-              <a:rPr lang="en-US" smtClean="0"/>
+              <a:rPr lang="en-US" dirty="0" smtClean="0"/>
               <a:t>Third level</a:t>
             </a:r>
           </a:p>
           <a:p>
             <a:pPr lvl="3"/>
             <a:r>
-              <a:rPr lang="en-US" smtClean="0"/>
+              <a:rPr lang="en-US" dirty="0" smtClean="0"/>
               <a:t>Fourth level</a:t>
             </a:r>
           </a:p>
           <a:p>
             <a:pPr lvl="4"/>
             <a:r>
-              <a:rPr lang="en-US" smtClean="0"/>
+              <a:rPr lang="en-US" dirty="0" smtClean="0"/>
               <a:t>Fifth level</a:t>
             </a:r>
-            <a:endParaRPr lang="en-US"/>
+            <a:endParaRPr lang="en-US" dirty="0"/>
           </a:p>
         </p:txBody>
       </p:sp>
@@ -2414,8 +2428,8 @@
         </p:nvSpPr>
         <p:spPr>
           <a:xfrm>
-            <a:off x="4645025" y="1535113"/>
-            <a:ext cx="4041775" cy="639762"/>
+            <a:off x="4690872" y="895350"/>
+            <a:ext cx="4453128" cy="639762"/>
           </a:xfrm>
         </p:spPr>
         <p:txBody>
@@ -2461,7 +2475,7 @@
           <a:p>
             <a:pPr lvl="0"/>
             <a:r>
-              <a:rPr lang="en-US" smtClean="0"/>
+              <a:rPr lang="en-US" dirty="0" smtClean="0"/>
               <a:t>Click to edit Master text styles</a:t>
             </a:r>
           </a:p>
@@ -2479,8 +2493,8 @@
         </p:nvSpPr>
         <p:spPr>
           <a:xfrm>
-            <a:off x="4645025" y="2174875"/>
-            <a:ext cx="4041775" cy="3951288"/>
+            <a:off x="4690872" y="1535112"/>
+            <a:ext cx="4453128" cy="3951288"/>
           </a:xfrm>
         </p:spPr>
         <p:txBody>
@@ -2517,38 +2531,38 @@
           <a:p>
             <a:pPr lvl="0"/>
             <a:r>
-              <a:rPr lang="en-US" smtClean="0"/>
+              <a:rPr lang="en-US" dirty="0" smtClean="0"/>
               <a:t>Click to edit Master text styles</a:t>
             </a:r>
           </a:p>
           <a:p>
             <a:pPr lvl="1"/>
             <a:r>
-              <a:rPr lang="en-US" smtClean="0"/>
+              <a:rPr lang="en-US" dirty="0" smtClean="0"/>
               <a:t>Second level</a:t>
             </a:r>
           </a:p>
           <a:p>
             <a:pPr lvl="2"/>
             <a:r>
-              <a:rPr lang="en-US" smtClean="0"/>
+              <a:rPr lang="en-US" dirty="0" smtClean="0"/>
               <a:t>Third level</a:t>
             </a:r>
           </a:p>
           <a:p>
             <a:pPr lvl="3"/>
             <a:r>
-              <a:rPr lang="en-US" smtClean="0"/>
+              <a:rPr lang="en-US" dirty="0" smtClean="0"/>
               <a:t>Fourth level</a:t>
             </a:r>
           </a:p>
           <a:p>
             <a:pPr lvl="4"/>
             <a:r>
-              <a:rPr lang="en-US" smtClean="0"/>
+              <a:rPr lang="en-US" dirty="0" smtClean="0"/>
               <a:t>Fifth level</a:t>
             </a:r>
-            <a:endParaRPr lang="en-US"/>
+            <a:endParaRPr lang="en-US" dirty="0"/>
           </a:p>
         </p:txBody>
       </p:sp>

</xml_diff>